<commit_message>
Updating Bayes_Opt slide to include potential drawback.
</commit_message>
<xml_diff>
--- a/Exploring Various Optimizers.pptx
+++ b/Exploring Various Optimizers.pptx
@@ -6584,171 +6584,6 @@
       </p:cxnSp>
       <p:sp>
         <p:nvSpPr>
-          <p:cNvPr id="23" name="TextBox 22">
-            <a:extLst>
-              <a:ext uri="{FF2B5EF4-FFF2-40B4-BE49-F238E27FC236}">
-                <a16:creationId xmlns:a16="http://schemas.microsoft.com/office/drawing/2014/main" id="{4BAFBEC0-6F97-9543-8DC1-F56386EECBF1}"/>
-              </a:ext>
-            </a:extLst>
-          </p:cNvPr>
-          <p:cNvSpPr txBox="1"/>
-          <p:nvPr/>
-        </p:nvSpPr>
-        <p:spPr>
-          <a:xfrm>
-            <a:off x="5521776" y="4509482"/>
-            <a:ext cx="5374512" cy="2031325"/>
-          </a:xfrm>
-          <a:prstGeom prst="rect">
-            <a:avLst/>
-          </a:prstGeom>
-          <a:noFill/>
-        </p:spPr>
-        <p:txBody>
-          <a:bodyPr wrap="square" rtlCol="0">
-            <a:spAutoFit/>
-          </a:bodyPr>
-          <a:lstStyle/>
-          <a:p>
-            <a:r>
-              <a:rPr lang="en-US" sz="1400" b="1" dirty="0"/>
-              <a:t>Bayes_Opt:</a:t>
-            </a:r>
-          </a:p>
-          <a:p>
-            <a:endParaRPr lang="en-US" sz="1400" dirty="0"/>
-          </a:p>
-          <a:p>
-            <a:r>
-              <a:rPr lang="en-US" sz="1400" dirty="0"/>
-              <a:t>1. </a:t>
-            </a:r>
-            <a:r>
-              <a:rPr lang="en-US" sz="1400" b="1" dirty="0"/>
-              <a:t>for </a:t>
-            </a:r>
-            <a:r>
-              <a:rPr lang="en-US" sz="1400" dirty="0"/>
-              <a:t>t = 1, 2… </a:t>
-            </a:r>
-            <a:r>
-              <a:rPr lang="en-US" sz="1400" b="1" dirty="0"/>
-              <a:t>do</a:t>
-            </a:r>
-          </a:p>
-          <a:p>
-            <a:r>
-              <a:rPr lang="en-US" sz="1400" dirty="0"/>
-              <a:t>2. Find </a:t>
-            </a:r>
-            <a:r>
-              <a:rPr lang="en-US" sz="1400" i="1" dirty="0"/>
-              <a:t>x</a:t>
-            </a:r>
-            <a:r>
-              <a:rPr lang="en-US" sz="1400" i="1" baseline="-25000" dirty="0"/>
-              <a:t>t</a:t>
-            </a:r>
-            <a:r>
-              <a:rPr lang="en-US" sz="1400" dirty="0"/>
-              <a:t> by combining attributes of the posterior distribution in a utility (acquisition) function </a:t>
-            </a:r>
-            <a:r>
-              <a:rPr lang="en-US" sz="1400" i="1" dirty="0"/>
-              <a:t>u</a:t>
-            </a:r>
-            <a:r>
-              <a:rPr lang="en-US" sz="1400" dirty="0"/>
-              <a:t> and maximizing:</a:t>
-            </a:r>
-          </a:p>
-          <a:p>
-            <a:r>
-              <a:rPr lang="en-US" sz="1400" dirty="0"/>
-              <a:t>3. Sample the objective function:</a:t>
-            </a:r>
-          </a:p>
-          <a:p>
-            <a:pPr algn="ctr"/>
-            <a:r>
-              <a:rPr lang="en-US" sz="1400" dirty="0"/>
-              <a:t>y</a:t>
-            </a:r>
-            <a:r>
-              <a:rPr lang="en-US" sz="1400" baseline="-25000" dirty="0"/>
-              <a:t>t</a:t>
-            </a:r>
-            <a:r>
-              <a:rPr lang="en-US" sz="1400" dirty="0"/>
-              <a:t> = f(x</a:t>
-            </a:r>
-            <a:r>
-              <a:rPr lang="en-US" sz="1400" baseline="-25000" dirty="0"/>
-              <a:t>t</a:t>
-            </a:r>
-            <a:r>
-              <a:rPr lang="en-US" sz="1400" dirty="0"/>
-              <a:t>) = ɛ</a:t>
-            </a:r>
-            <a:r>
-              <a:rPr lang="en-US" sz="1400" baseline="-25000" dirty="0"/>
-              <a:t>t</a:t>
-            </a:r>
-          </a:p>
-          <a:p>
-            <a:r>
-              <a:rPr lang="en-US" sz="1400" dirty="0"/>
-              <a:t>4. Augment the data D</a:t>
-            </a:r>
-            <a:r>
-              <a:rPr lang="en-US" sz="1400" baseline="-25000" dirty="0"/>
-              <a:t>1:t</a:t>
-            </a:r>
-            <a:r>
-              <a:rPr lang="en-US" sz="1400" dirty="0"/>
-              <a:t> = {D</a:t>
-            </a:r>
-            <a:r>
-              <a:rPr lang="en-US" sz="1400" baseline="-25000" dirty="0"/>
-              <a:t>1:t-1</a:t>
-            </a:r>
-            <a:r>
-              <a:rPr lang="en-US" sz="1400" dirty="0"/>
-              <a:t>, (x</a:t>
-            </a:r>
-            <a:r>
-              <a:rPr lang="en-US" sz="1400" baseline="-25000" dirty="0"/>
-              <a:t>t</a:t>
-            </a:r>
-            <a:r>
-              <a:rPr lang="en-US" sz="1400" dirty="0"/>
-              <a:t>, y</a:t>
-            </a:r>
-            <a:r>
-              <a:rPr lang="en-US" sz="1400" baseline="-25000" dirty="0"/>
-              <a:t>t</a:t>
-            </a:r>
-            <a:r>
-              <a:rPr lang="en-US" sz="1400" dirty="0"/>
-              <a:t>)}</a:t>
-            </a:r>
-            <a:endParaRPr lang="en-US" sz="1400" baseline="-25000" dirty="0"/>
-          </a:p>
-          <a:p>
-            <a:r>
-              <a:rPr lang="en-US" sz="1400" dirty="0"/>
-              <a:t>5. </a:t>
-            </a:r>
-            <a:r>
-              <a:rPr lang="en-US" sz="1400" b="1" dirty="0"/>
-              <a:t>end for</a:t>
-            </a:r>
-            <a:endParaRPr lang="en-US" sz="1400" baseline="-25000" dirty="0"/>
-          </a:p>
-        </p:txBody>
-      </p:sp>
-      <p:sp>
-        <p:nvSpPr>
           <p:cNvPr id="25" name="Content Placeholder 2">
             <a:extLst>
               <a:ext uri="{FF2B5EF4-FFF2-40B4-BE49-F238E27FC236}">
@@ -6765,13 +6600,13 @@
         </p:nvSpPr>
         <p:spPr>
           <a:xfrm>
-            <a:off x="4423549" y="1398109"/>
-            <a:ext cx="7570966" cy="3002267"/>
+            <a:off x="4376808" y="1716196"/>
+            <a:ext cx="7570966" cy="4004982"/>
           </a:xfrm>
         </p:spPr>
         <p:txBody>
           <a:bodyPr>
-            <a:normAutofit lnSpcReduction="10000"/>
+            <a:normAutofit/>
           </a:bodyPr>
           <a:lstStyle/>
           <a:p>
@@ -6841,6 +6676,32 @@
               <a:rPr lang="en-US" sz="1400" dirty="0"/>
               <a:t>Drilling for oil, testing each location may cost $1 million or more</a:t>
             </a:r>
+          </a:p>
+          <a:p>
+            <a:pPr marL="0" lvl="1" indent="0">
+              <a:spcBef>
+                <a:spcPts val="1000"/>
+              </a:spcBef>
+              <a:buNone/>
+            </a:pPr>
+            <a:endParaRPr lang="en-US" sz="1200" dirty="0"/>
+          </a:p>
+          <a:p>
+            <a:pPr marL="228600" lvl="1">
+              <a:spcBef>
+                <a:spcPts val="1000"/>
+              </a:spcBef>
+            </a:pPr>
+            <a:r>
+              <a:rPr lang="en-US" sz="1800" dirty="0"/>
+              <a:t>Since this is a constrained optimization technique, so you must specify the bounds for each parameter for it to work</a:t>
+            </a:r>
+          </a:p>
+          <a:p>
+            <a:pPr marL="457200" lvl="1" indent="0">
+              <a:buNone/>
+            </a:pPr>
+            <a:endParaRPr lang="en-US" sz="1400" dirty="0"/>
           </a:p>
         </p:txBody>
       </p:sp>

</xml_diff>